<commit_message>
finished spark streaming consumer
</commit_message>
<xml_diff>
--- a/docs/slide_images.pptx
+++ b/docs/slide_images.pptx
@@ -7,6 +7,7 @@
   <p:sldIdLst>
     <p:sldId id="257" r:id="rId2"/>
     <p:sldId id="258" r:id="rId3"/>
+    <p:sldId id="259" r:id="rId4"/>
   </p:sldIdLst>
   <p:sldSz cx="12192000" cy="6858000"/>
   <p:notesSz cx="6858000" cy="9144000"/>
@@ -105,6 +106,11 @@
       </a:defRPr>
     </a:lvl9pPr>
   </p:defaultTextStyle>
+  <p:extLst>
+    <p:ext uri="{EFAFB233-063F-42B5-8137-9DF3F51BA10A}">
+      <p15:sldGuideLst xmlns:p15="http://schemas.microsoft.com/office/powerpoint/2012/main"/>
+    </p:ext>
+  </p:extLst>
 </p:presentation>
 </file>
 
@@ -257,7 +263,7 @@
           <a:p>
             <a:fld id="{B6A99462-4F3F-4357-B2CA-2C3DC68FDF6C}" type="datetimeFigureOut">
               <a:rPr lang="en-US" smtClean="0"/>
-              <a:t>9/24/2023</a:t>
+              <a:t>10/3/2023</a:t>
             </a:fld>
             <a:endParaRPr lang="en-US"/>
           </a:p>
@@ -457,7 +463,7 @@
           <a:p>
             <a:fld id="{B6A99462-4F3F-4357-B2CA-2C3DC68FDF6C}" type="datetimeFigureOut">
               <a:rPr lang="en-US" smtClean="0"/>
-              <a:t>9/24/2023</a:t>
+              <a:t>10/3/2023</a:t>
             </a:fld>
             <a:endParaRPr lang="en-US"/>
           </a:p>
@@ -667,7 +673,7 @@
           <a:p>
             <a:fld id="{B6A99462-4F3F-4357-B2CA-2C3DC68FDF6C}" type="datetimeFigureOut">
               <a:rPr lang="en-US" smtClean="0"/>
-              <a:t>9/24/2023</a:t>
+              <a:t>10/3/2023</a:t>
             </a:fld>
             <a:endParaRPr lang="en-US"/>
           </a:p>
@@ -867,7 +873,7 @@
           <a:p>
             <a:fld id="{B6A99462-4F3F-4357-B2CA-2C3DC68FDF6C}" type="datetimeFigureOut">
               <a:rPr lang="en-US" smtClean="0"/>
-              <a:t>9/24/2023</a:t>
+              <a:t>10/3/2023</a:t>
             </a:fld>
             <a:endParaRPr lang="en-US"/>
           </a:p>
@@ -1143,7 +1149,7 @@
           <a:p>
             <a:fld id="{B6A99462-4F3F-4357-B2CA-2C3DC68FDF6C}" type="datetimeFigureOut">
               <a:rPr lang="en-US" smtClean="0"/>
-              <a:t>9/24/2023</a:t>
+              <a:t>10/3/2023</a:t>
             </a:fld>
             <a:endParaRPr lang="en-US"/>
           </a:p>
@@ -1411,7 +1417,7 @@
           <a:p>
             <a:fld id="{B6A99462-4F3F-4357-B2CA-2C3DC68FDF6C}" type="datetimeFigureOut">
               <a:rPr lang="en-US" smtClean="0"/>
-              <a:t>9/24/2023</a:t>
+              <a:t>10/3/2023</a:t>
             </a:fld>
             <a:endParaRPr lang="en-US"/>
           </a:p>
@@ -1826,7 +1832,7 @@
           <a:p>
             <a:fld id="{B6A99462-4F3F-4357-B2CA-2C3DC68FDF6C}" type="datetimeFigureOut">
               <a:rPr lang="en-US" smtClean="0"/>
-              <a:t>9/24/2023</a:t>
+              <a:t>10/3/2023</a:t>
             </a:fld>
             <a:endParaRPr lang="en-US"/>
           </a:p>
@@ -1968,7 +1974,7 @@
           <a:p>
             <a:fld id="{B6A99462-4F3F-4357-B2CA-2C3DC68FDF6C}" type="datetimeFigureOut">
               <a:rPr lang="en-US" smtClean="0"/>
-              <a:t>9/24/2023</a:t>
+              <a:t>10/3/2023</a:t>
             </a:fld>
             <a:endParaRPr lang="en-US"/>
           </a:p>
@@ -2081,7 +2087,7 @@
           <a:p>
             <a:fld id="{B6A99462-4F3F-4357-B2CA-2C3DC68FDF6C}" type="datetimeFigureOut">
               <a:rPr lang="en-US" smtClean="0"/>
-              <a:t>9/24/2023</a:t>
+              <a:t>10/3/2023</a:t>
             </a:fld>
             <a:endParaRPr lang="en-US"/>
           </a:p>
@@ -2394,7 +2400,7 @@
           <a:p>
             <a:fld id="{B6A99462-4F3F-4357-B2CA-2C3DC68FDF6C}" type="datetimeFigureOut">
               <a:rPr lang="en-US" smtClean="0"/>
-              <a:t>9/24/2023</a:t>
+              <a:t>10/3/2023</a:t>
             </a:fld>
             <a:endParaRPr lang="en-US"/>
           </a:p>
@@ -2683,7 +2689,7 @@
           <a:p>
             <a:fld id="{B6A99462-4F3F-4357-B2CA-2C3DC68FDF6C}" type="datetimeFigureOut">
               <a:rPr lang="en-US" smtClean="0"/>
-              <a:t>9/24/2023</a:t>
+              <a:t>10/3/2023</a:t>
             </a:fld>
             <a:endParaRPr lang="en-US"/>
           </a:p>
@@ -2926,7 +2932,7 @@
           <a:p>
             <a:fld id="{B6A99462-4F3F-4357-B2CA-2C3DC68FDF6C}" type="datetimeFigureOut">
               <a:rPr lang="en-US" smtClean="0"/>
-              <a:t>9/24/2023</a:t>
+              <a:t>10/3/2023</a:t>
             </a:fld>
             <a:endParaRPr lang="en-US"/>
           </a:p>
@@ -5000,6 +5006,1713 @@
 </p:sld>
 </file>
 
+<file path=ppt/slides/slide3.xml><?xml version="1.0" encoding="utf-8"?>
+<p:sld xmlns:a="http://schemas.openxmlformats.org/drawingml/2006/main" xmlns:r="http://schemas.openxmlformats.org/officeDocument/2006/relationships" xmlns:p="http://schemas.openxmlformats.org/presentationml/2006/main">
+  <p:cSld>
+    <p:spTree>
+      <p:nvGrpSpPr>
+        <p:cNvPr id="1" name=""/>
+        <p:cNvGrpSpPr/>
+        <p:nvPr/>
+      </p:nvGrpSpPr>
+      <p:grpSpPr>
+        <a:xfrm>
+          <a:off x="0" y="0"/>
+          <a:ext cx="0" cy="0"/>
+          <a:chOff x="0" y="0"/>
+          <a:chExt cx="0" cy="0"/>
+        </a:xfrm>
+      </p:grpSpPr>
+      <p:grpSp>
+        <p:nvGrpSpPr>
+          <p:cNvPr id="70" name="组合 69">
+            <a:extLst>
+              <a:ext uri="{FF2B5EF4-FFF2-40B4-BE49-F238E27FC236}">
+                <a16:creationId xmlns:a16="http://schemas.microsoft.com/office/drawing/2014/main" id="{EFBCAFAA-E38F-C30A-EDEC-F764AAE48173}"/>
+              </a:ext>
+            </a:extLst>
+          </p:cNvPr>
+          <p:cNvGrpSpPr/>
+          <p:nvPr/>
+        </p:nvGrpSpPr>
+        <p:grpSpPr>
+          <a:xfrm>
+            <a:off x="1049666" y="1358073"/>
+            <a:ext cx="9168595" cy="1000971"/>
+            <a:chOff x="1049666" y="1358073"/>
+            <a:chExt cx="9168595" cy="1000971"/>
+          </a:xfrm>
+        </p:grpSpPr>
+        <p:grpSp>
+          <p:nvGrpSpPr>
+            <p:cNvPr id="53" name="组合 52">
+              <a:extLst>
+                <a:ext uri="{FF2B5EF4-FFF2-40B4-BE49-F238E27FC236}">
+                  <a16:creationId xmlns:a16="http://schemas.microsoft.com/office/drawing/2014/main" id="{B6D80751-9A72-E2B3-895C-B24C3FC2EF0F}"/>
+                </a:ext>
+              </a:extLst>
+            </p:cNvPr>
+            <p:cNvGrpSpPr/>
+            <p:nvPr/>
+          </p:nvGrpSpPr>
+          <p:grpSpPr>
+            <a:xfrm>
+              <a:off x="1049666" y="1358073"/>
+              <a:ext cx="9098335" cy="1000971"/>
+              <a:chOff x="1049666" y="1358073"/>
+              <a:chExt cx="9098335" cy="1000971"/>
+            </a:xfrm>
+          </p:grpSpPr>
+          <p:grpSp>
+            <p:nvGrpSpPr>
+              <p:cNvPr id="47" name="组合 46">
+                <a:extLst>
+                  <a:ext uri="{FF2B5EF4-FFF2-40B4-BE49-F238E27FC236}">
+                    <a16:creationId xmlns:a16="http://schemas.microsoft.com/office/drawing/2014/main" id="{9E3E0038-A229-3835-F140-104C2F7C4D7F}"/>
+                  </a:ext>
+                </a:extLst>
+              </p:cNvPr>
+              <p:cNvGrpSpPr/>
+              <p:nvPr/>
+            </p:nvGrpSpPr>
+            <p:grpSpPr>
+              <a:xfrm>
+                <a:off x="1049666" y="1358073"/>
+                <a:ext cx="9091861" cy="1000971"/>
+                <a:chOff x="1049666" y="1358073"/>
+                <a:chExt cx="8197136" cy="1000971"/>
+              </a:xfrm>
+            </p:grpSpPr>
+            <p:grpSp>
+              <p:nvGrpSpPr>
+                <p:cNvPr id="5" name="组合 4">
+                  <a:extLst>
+                    <a:ext uri="{FF2B5EF4-FFF2-40B4-BE49-F238E27FC236}">
+                      <a16:creationId xmlns:a16="http://schemas.microsoft.com/office/drawing/2014/main" id="{92EF4374-6BFF-E753-373F-A1C2619308C0}"/>
+                    </a:ext>
+                  </a:extLst>
+                </p:cNvPr>
+                <p:cNvGrpSpPr/>
+                <p:nvPr/>
+              </p:nvGrpSpPr>
+              <p:grpSpPr>
+                <a:xfrm>
+                  <a:off x="1049666" y="1358073"/>
+                  <a:ext cx="8197136" cy="1000971"/>
+                  <a:chOff x="1049666" y="1358073"/>
+                  <a:chExt cx="8197136" cy="1000971"/>
+                </a:xfrm>
+              </p:grpSpPr>
+              <p:sp>
+                <p:nvSpPr>
+                  <p:cNvPr id="2" name="矩形 1">
+                    <a:extLst>
+                      <a:ext uri="{FF2B5EF4-FFF2-40B4-BE49-F238E27FC236}">
+                        <a16:creationId xmlns:a16="http://schemas.microsoft.com/office/drawing/2014/main" id="{F739283A-79F1-1C94-CF89-525BAAD67D27}"/>
+                      </a:ext>
+                    </a:extLst>
+                  </p:cNvPr>
+                  <p:cNvSpPr/>
+                  <p:nvPr/>
+                </p:nvSpPr>
+                <p:spPr>
+                  <a:xfrm>
+                    <a:off x="1049666" y="1358073"/>
+                    <a:ext cx="8197136" cy="1000971"/>
+                  </a:xfrm>
+                  <a:prstGeom prst="rect">
+                    <a:avLst/>
+                  </a:prstGeom>
+                  <a:solidFill>
+                    <a:schemeClr val="bg1"/>
+                  </a:solidFill>
+                </p:spPr>
+                <p:style>
+                  <a:lnRef idx="2">
+                    <a:schemeClr val="accent1">
+                      <a:shade val="15000"/>
+                    </a:schemeClr>
+                  </a:lnRef>
+                  <a:fillRef idx="1">
+                    <a:schemeClr val="accent1"/>
+                  </a:fillRef>
+                  <a:effectRef idx="0">
+                    <a:schemeClr val="accent1"/>
+                  </a:effectRef>
+                  <a:fontRef idx="minor">
+                    <a:schemeClr val="lt1"/>
+                  </a:fontRef>
+                </p:style>
+                <p:txBody>
+                  <a:bodyPr rtlCol="0" anchor="ctr"/>
+                  <a:lstStyle/>
+                  <a:p>
+                    <a:pPr algn="ctr"/>
+                    <a:endParaRPr lang="en-US" dirty="0"/>
+                  </a:p>
+                </p:txBody>
+              </p:sp>
+              <p:cxnSp>
+                <p:nvCxnSpPr>
+                  <p:cNvPr id="4" name="直接连接符 3">
+                    <a:extLst>
+                      <a:ext uri="{FF2B5EF4-FFF2-40B4-BE49-F238E27FC236}">
+                        <a16:creationId xmlns:a16="http://schemas.microsoft.com/office/drawing/2014/main" id="{AA795267-FAFA-2BDB-52C8-44145A834B3D}"/>
+                      </a:ext>
+                    </a:extLst>
+                  </p:cNvPr>
+                  <p:cNvCxnSpPr>
+                    <a:stCxn id="2" idx="1"/>
+                    <a:endCxn id="2" idx="3"/>
+                  </p:cNvCxnSpPr>
+                  <p:nvPr/>
+                </p:nvCxnSpPr>
+                <p:spPr>
+                  <a:xfrm>
+                    <a:off x="1049666" y="1858559"/>
+                    <a:ext cx="8197136" cy="0"/>
+                  </a:xfrm>
+                  <a:prstGeom prst="line">
+                    <a:avLst/>
+                  </a:prstGeom>
+                  <a:ln w="12700">
+                    <a:solidFill>
+                      <a:schemeClr val="tx1"/>
+                    </a:solidFill>
+                  </a:ln>
+                </p:spPr>
+                <p:style>
+                  <a:lnRef idx="1">
+                    <a:schemeClr val="accent1"/>
+                  </a:lnRef>
+                  <a:fillRef idx="0">
+                    <a:schemeClr val="accent1"/>
+                  </a:fillRef>
+                  <a:effectRef idx="0">
+                    <a:schemeClr val="accent1"/>
+                  </a:effectRef>
+                  <a:fontRef idx="minor">
+                    <a:schemeClr val="tx1"/>
+                  </a:fontRef>
+                </p:style>
+              </p:cxnSp>
+            </p:grpSp>
+            <p:cxnSp>
+              <p:nvCxnSpPr>
+                <p:cNvPr id="27" name="直接连接符 26">
+                  <a:extLst>
+                    <a:ext uri="{FF2B5EF4-FFF2-40B4-BE49-F238E27FC236}">
+                      <a16:creationId xmlns:a16="http://schemas.microsoft.com/office/drawing/2014/main" id="{3B1ACABA-8278-B425-1A15-14507ECAFA91}"/>
+                    </a:ext>
+                  </a:extLst>
+                </p:cNvPr>
+                <p:cNvCxnSpPr>
+                  <a:cxnSpLocks/>
+                </p:cNvCxnSpPr>
+                <p:nvPr/>
+              </p:nvCxnSpPr>
+              <p:spPr>
+                <a:xfrm>
+                  <a:off x="1591278" y="1858559"/>
+                  <a:ext cx="0" cy="500485"/>
+                </a:xfrm>
+                <a:prstGeom prst="line">
+                  <a:avLst/>
+                </a:prstGeom>
+                <a:ln w="12700">
+                  <a:solidFill>
+                    <a:schemeClr val="tx1"/>
+                  </a:solidFill>
+                </a:ln>
+              </p:spPr>
+              <p:style>
+                <a:lnRef idx="1">
+                  <a:schemeClr val="accent1"/>
+                </a:lnRef>
+                <a:fillRef idx="0">
+                  <a:schemeClr val="accent1"/>
+                </a:fillRef>
+                <a:effectRef idx="0">
+                  <a:schemeClr val="accent1"/>
+                </a:effectRef>
+                <a:fontRef idx="minor">
+                  <a:schemeClr val="tx1"/>
+                </a:fontRef>
+              </p:style>
+            </p:cxnSp>
+            <p:cxnSp>
+              <p:nvCxnSpPr>
+                <p:cNvPr id="28" name="直接连接符 27">
+                  <a:extLst>
+                    <a:ext uri="{FF2B5EF4-FFF2-40B4-BE49-F238E27FC236}">
+                      <a16:creationId xmlns:a16="http://schemas.microsoft.com/office/drawing/2014/main" id="{F4E5F296-8006-24E2-4595-05D501D62137}"/>
+                    </a:ext>
+                  </a:extLst>
+                </p:cNvPr>
+                <p:cNvCxnSpPr>
+                  <a:cxnSpLocks/>
+                </p:cNvCxnSpPr>
+                <p:nvPr/>
+              </p:nvCxnSpPr>
+              <p:spPr>
+                <a:xfrm>
+                  <a:off x="2137754" y="1858559"/>
+                  <a:ext cx="0" cy="500485"/>
+                </a:xfrm>
+                <a:prstGeom prst="line">
+                  <a:avLst/>
+                </a:prstGeom>
+                <a:ln w="12700">
+                  <a:solidFill>
+                    <a:schemeClr val="tx1"/>
+                  </a:solidFill>
+                </a:ln>
+              </p:spPr>
+              <p:style>
+                <a:lnRef idx="1">
+                  <a:schemeClr val="accent1"/>
+                </a:lnRef>
+                <a:fillRef idx="0">
+                  <a:schemeClr val="accent1"/>
+                </a:fillRef>
+                <a:effectRef idx="0">
+                  <a:schemeClr val="accent1"/>
+                </a:effectRef>
+                <a:fontRef idx="minor">
+                  <a:schemeClr val="tx1"/>
+                </a:fontRef>
+              </p:style>
+            </p:cxnSp>
+            <p:cxnSp>
+              <p:nvCxnSpPr>
+                <p:cNvPr id="29" name="直接连接符 28">
+                  <a:extLst>
+                    <a:ext uri="{FF2B5EF4-FFF2-40B4-BE49-F238E27FC236}">
+                      <a16:creationId xmlns:a16="http://schemas.microsoft.com/office/drawing/2014/main" id="{D278A952-C0CB-9FE1-C0A0-D51935E0EE89}"/>
+                    </a:ext>
+                  </a:extLst>
+                </p:cNvPr>
+                <p:cNvCxnSpPr>
+                  <a:cxnSpLocks/>
+                </p:cNvCxnSpPr>
+                <p:nvPr/>
+              </p:nvCxnSpPr>
+              <p:spPr>
+                <a:xfrm>
+                  <a:off x="2684230" y="1858559"/>
+                  <a:ext cx="0" cy="500485"/>
+                </a:xfrm>
+                <a:prstGeom prst="line">
+                  <a:avLst/>
+                </a:prstGeom>
+                <a:ln w="12700">
+                  <a:solidFill>
+                    <a:schemeClr val="tx1"/>
+                  </a:solidFill>
+                </a:ln>
+              </p:spPr>
+              <p:style>
+                <a:lnRef idx="1">
+                  <a:schemeClr val="accent1"/>
+                </a:lnRef>
+                <a:fillRef idx="0">
+                  <a:schemeClr val="accent1"/>
+                </a:fillRef>
+                <a:effectRef idx="0">
+                  <a:schemeClr val="accent1"/>
+                </a:effectRef>
+                <a:fontRef idx="minor">
+                  <a:schemeClr val="tx1"/>
+                </a:fontRef>
+              </p:style>
+            </p:cxnSp>
+            <p:cxnSp>
+              <p:nvCxnSpPr>
+                <p:cNvPr id="30" name="直接连接符 29">
+                  <a:extLst>
+                    <a:ext uri="{FF2B5EF4-FFF2-40B4-BE49-F238E27FC236}">
+                      <a16:creationId xmlns:a16="http://schemas.microsoft.com/office/drawing/2014/main" id="{008FBDC8-A9CB-3FF2-D135-99B40AC239AF}"/>
+                    </a:ext>
+                  </a:extLst>
+                </p:cNvPr>
+                <p:cNvCxnSpPr>
+                  <a:cxnSpLocks/>
+                </p:cNvCxnSpPr>
+                <p:nvPr/>
+              </p:nvCxnSpPr>
+              <p:spPr>
+                <a:xfrm>
+                  <a:off x="3230706" y="1858559"/>
+                  <a:ext cx="0" cy="500485"/>
+                </a:xfrm>
+                <a:prstGeom prst="line">
+                  <a:avLst/>
+                </a:prstGeom>
+                <a:ln w="12700">
+                  <a:solidFill>
+                    <a:schemeClr val="tx1"/>
+                  </a:solidFill>
+                </a:ln>
+              </p:spPr>
+              <p:style>
+                <a:lnRef idx="1">
+                  <a:schemeClr val="accent1"/>
+                </a:lnRef>
+                <a:fillRef idx="0">
+                  <a:schemeClr val="accent1"/>
+                </a:fillRef>
+                <a:effectRef idx="0">
+                  <a:schemeClr val="accent1"/>
+                </a:effectRef>
+                <a:fontRef idx="minor">
+                  <a:schemeClr val="tx1"/>
+                </a:fontRef>
+              </p:style>
+            </p:cxnSp>
+            <p:cxnSp>
+              <p:nvCxnSpPr>
+                <p:cNvPr id="31" name="直接连接符 30">
+                  <a:extLst>
+                    <a:ext uri="{FF2B5EF4-FFF2-40B4-BE49-F238E27FC236}">
+                      <a16:creationId xmlns:a16="http://schemas.microsoft.com/office/drawing/2014/main" id="{FA43396D-03AB-63EF-400D-8EA1909EEBF3}"/>
+                    </a:ext>
+                  </a:extLst>
+                </p:cNvPr>
+                <p:cNvCxnSpPr>
+                  <a:cxnSpLocks/>
+                </p:cNvCxnSpPr>
+                <p:nvPr/>
+              </p:nvCxnSpPr>
+              <p:spPr>
+                <a:xfrm>
+                  <a:off x="3777182" y="1858559"/>
+                  <a:ext cx="0" cy="500485"/>
+                </a:xfrm>
+                <a:prstGeom prst="line">
+                  <a:avLst/>
+                </a:prstGeom>
+                <a:ln w="12700">
+                  <a:solidFill>
+                    <a:schemeClr val="tx1"/>
+                  </a:solidFill>
+                </a:ln>
+              </p:spPr>
+              <p:style>
+                <a:lnRef idx="1">
+                  <a:schemeClr val="accent1"/>
+                </a:lnRef>
+                <a:fillRef idx="0">
+                  <a:schemeClr val="accent1"/>
+                </a:fillRef>
+                <a:effectRef idx="0">
+                  <a:schemeClr val="accent1"/>
+                </a:effectRef>
+                <a:fontRef idx="minor">
+                  <a:schemeClr val="tx1"/>
+                </a:fontRef>
+              </p:style>
+            </p:cxnSp>
+            <p:cxnSp>
+              <p:nvCxnSpPr>
+                <p:cNvPr id="32" name="直接连接符 31">
+                  <a:extLst>
+                    <a:ext uri="{FF2B5EF4-FFF2-40B4-BE49-F238E27FC236}">
+                      <a16:creationId xmlns:a16="http://schemas.microsoft.com/office/drawing/2014/main" id="{87204BCC-BEE5-6A46-6C2B-93A3BA165F93}"/>
+                    </a:ext>
+                  </a:extLst>
+                </p:cNvPr>
+                <p:cNvCxnSpPr>
+                  <a:cxnSpLocks/>
+                </p:cNvCxnSpPr>
+                <p:nvPr/>
+              </p:nvCxnSpPr>
+              <p:spPr>
+                <a:xfrm>
+                  <a:off x="4323658" y="1858559"/>
+                  <a:ext cx="0" cy="500485"/>
+                </a:xfrm>
+                <a:prstGeom prst="line">
+                  <a:avLst/>
+                </a:prstGeom>
+                <a:ln w="12700">
+                  <a:solidFill>
+                    <a:schemeClr val="tx1"/>
+                  </a:solidFill>
+                </a:ln>
+              </p:spPr>
+              <p:style>
+                <a:lnRef idx="1">
+                  <a:schemeClr val="accent1"/>
+                </a:lnRef>
+                <a:fillRef idx="0">
+                  <a:schemeClr val="accent1"/>
+                </a:fillRef>
+                <a:effectRef idx="0">
+                  <a:schemeClr val="accent1"/>
+                </a:effectRef>
+                <a:fontRef idx="minor">
+                  <a:schemeClr val="tx1"/>
+                </a:fontRef>
+              </p:style>
+            </p:cxnSp>
+            <p:cxnSp>
+              <p:nvCxnSpPr>
+                <p:cNvPr id="33" name="直接连接符 32">
+                  <a:extLst>
+                    <a:ext uri="{FF2B5EF4-FFF2-40B4-BE49-F238E27FC236}">
+                      <a16:creationId xmlns:a16="http://schemas.microsoft.com/office/drawing/2014/main" id="{730D1A09-CB3A-567F-CCB4-39C74D53B2B5}"/>
+                    </a:ext>
+                  </a:extLst>
+                </p:cNvPr>
+                <p:cNvCxnSpPr>
+                  <a:cxnSpLocks/>
+                </p:cNvCxnSpPr>
+                <p:nvPr/>
+              </p:nvCxnSpPr>
+              <p:spPr>
+                <a:xfrm>
+                  <a:off x="4870134" y="1858559"/>
+                  <a:ext cx="0" cy="500485"/>
+                </a:xfrm>
+                <a:prstGeom prst="line">
+                  <a:avLst/>
+                </a:prstGeom>
+                <a:ln w="12700">
+                  <a:solidFill>
+                    <a:schemeClr val="tx1"/>
+                  </a:solidFill>
+                </a:ln>
+              </p:spPr>
+              <p:style>
+                <a:lnRef idx="1">
+                  <a:schemeClr val="accent1"/>
+                </a:lnRef>
+                <a:fillRef idx="0">
+                  <a:schemeClr val="accent1"/>
+                </a:fillRef>
+                <a:effectRef idx="0">
+                  <a:schemeClr val="accent1"/>
+                </a:effectRef>
+                <a:fontRef idx="minor">
+                  <a:schemeClr val="tx1"/>
+                </a:fontRef>
+              </p:style>
+            </p:cxnSp>
+            <p:cxnSp>
+              <p:nvCxnSpPr>
+                <p:cNvPr id="34" name="直接连接符 33">
+                  <a:extLst>
+                    <a:ext uri="{FF2B5EF4-FFF2-40B4-BE49-F238E27FC236}">
+                      <a16:creationId xmlns:a16="http://schemas.microsoft.com/office/drawing/2014/main" id="{5F4761E8-C561-9598-26B1-AFFE5F17A581}"/>
+                    </a:ext>
+                  </a:extLst>
+                </p:cNvPr>
+                <p:cNvCxnSpPr>
+                  <a:cxnSpLocks/>
+                </p:cNvCxnSpPr>
+                <p:nvPr/>
+              </p:nvCxnSpPr>
+              <p:spPr>
+                <a:xfrm>
+                  <a:off x="5416610" y="1858559"/>
+                  <a:ext cx="0" cy="500485"/>
+                </a:xfrm>
+                <a:prstGeom prst="line">
+                  <a:avLst/>
+                </a:prstGeom>
+                <a:ln w="12700">
+                  <a:solidFill>
+                    <a:schemeClr val="tx1"/>
+                  </a:solidFill>
+                </a:ln>
+              </p:spPr>
+              <p:style>
+                <a:lnRef idx="1">
+                  <a:schemeClr val="accent1"/>
+                </a:lnRef>
+                <a:fillRef idx="0">
+                  <a:schemeClr val="accent1"/>
+                </a:fillRef>
+                <a:effectRef idx="0">
+                  <a:schemeClr val="accent1"/>
+                </a:effectRef>
+                <a:fontRef idx="minor">
+                  <a:schemeClr val="tx1"/>
+                </a:fontRef>
+              </p:style>
+            </p:cxnSp>
+            <p:cxnSp>
+              <p:nvCxnSpPr>
+                <p:cNvPr id="35" name="直接连接符 34">
+                  <a:extLst>
+                    <a:ext uri="{FF2B5EF4-FFF2-40B4-BE49-F238E27FC236}">
+                      <a16:creationId xmlns:a16="http://schemas.microsoft.com/office/drawing/2014/main" id="{C0BE62C8-B16B-A505-9F4B-378A89183ACC}"/>
+                    </a:ext>
+                  </a:extLst>
+                </p:cNvPr>
+                <p:cNvCxnSpPr>
+                  <a:cxnSpLocks/>
+                </p:cNvCxnSpPr>
+                <p:nvPr/>
+              </p:nvCxnSpPr>
+              <p:spPr>
+                <a:xfrm>
+                  <a:off x="5963086" y="1858559"/>
+                  <a:ext cx="0" cy="500485"/>
+                </a:xfrm>
+                <a:prstGeom prst="line">
+                  <a:avLst/>
+                </a:prstGeom>
+                <a:ln w="12700">
+                  <a:solidFill>
+                    <a:schemeClr val="tx1"/>
+                  </a:solidFill>
+                </a:ln>
+              </p:spPr>
+              <p:style>
+                <a:lnRef idx="1">
+                  <a:schemeClr val="accent1"/>
+                </a:lnRef>
+                <a:fillRef idx="0">
+                  <a:schemeClr val="accent1"/>
+                </a:fillRef>
+                <a:effectRef idx="0">
+                  <a:schemeClr val="accent1"/>
+                </a:effectRef>
+                <a:fontRef idx="minor">
+                  <a:schemeClr val="tx1"/>
+                </a:fontRef>
+              </p:style>
+            </p:cxnSp>
+            <p:cxnSp>
+              <p:nvCxnSpPr>
+                <p:cNvPr id="36" name="直接连接符 35">
+                  <a:extLst>
+                    <a:ext uri="{FF2B5EF4-FFF2-40B4-BE49-F238E27FC236}">
+                      <a16:creationId xmlns:a16="http://schemas.microsoft.com/office/drawing/2014/main" id="{A7617DB2-6182-F8F6-F3EB-9A1A4EFBDCA2}"/>
+                    </a:ext>
+                  </a:extLst>
+                </p:cNvPr>
+                <p:cNvCxnSpPr>
+                  <a:cxnSpLocks/>
+                </p:cNvCxnSpPr>
+                <p:nvPr/>
+              </p:nvCxnSpPr>
+              <p:spPr>
+                <a:xfrm>
+                  <a:off x="6509562" y="1858559"/>
+                  <a:ext cx="0" cy="500485"/>
+                </a:xfrm>
+                <a:prstGeom prst="line">
+                  <a:avLst/>
+                </a:prstGeom>
+                <a:ln w="12700">
+                  <a:solidFill>
+                    <a:schemeClr val="tx1"/>
+                  </a:solidFill>
+                </a:ln>
+              </p:spPr>
+              <p:style>
+                <a:lnRef idx="1">
+                  <a:schemeClr val="accent1"/>
+                </a:lnRef>
+                <a:fillRef idx="0">
+                  <a:schemeClr val="accent1"/>
+                </a:fillRef>
+                <a:effectRef idx="0">
+                  <a:schemeClr val="accent1"/>
+                </a:effectRef>
+                <a:fontRef idx="minor">
+                  <a:schemeClr val="tx1"/>
+                </a:fontRef>
+              </p:style>
+            </p:cxnSp>
+            <p:cxnSp>
+              <p:nvCxnSpPr>
+                <p:cNvPr id="37" name="直接连接符 36">
+                  <a:extLst>
+                    <a:ext uri="{FF2B5EF4-FFF2-40B4-BE49-F238E27FC236}">
+                      <a16:creationId xmlns:a16="http://schemas.microsoft.com/office/drawing/2014/main" id="{156FE221-83D8-4A96-B7C2-1043B42DDA06}"/>
+                    </a:ext>
+                  </a:extLst>
+                </p:cNvPr>
+                <p:cNvCxnSpPr>
+                  <a:cxnSpLocks/>
+                </p:cNvCxnSpPr>
+                <p:nvPr/>
+              </p:nvCxnSpPr>
+              <p:spPr>
+                <a:xfrm>
+                  <a:off x="7056038" y="1858559"/>
+                  <a:ext cx="0" cy="500485"/>
+                </a:xfrm>
+                <a:prstGeom prst="line">
+                  <a:avLst/>
+                </a:prstGeom>
+                <a:ln w="12700">
+                  <a:solidFill>
+                    <a:schemeClr val="tx1"/>
+                  </a:solidFill>
+                </a:ln>
+              </p:spPr>
+              <p:style>
+                <a:lnRef idx="1">
+                  <a:schemeClr val="accent1"/>
+                </a:lnRef>
+                <a:fillRef idx="0">
+                  <a:schemeClr val="accent1"/>
+                </a:fillRef>
+                <a:effectRef idx="0">
+                  <a:schemeClr val="accent1"/>
+                </a:effectRef>
+                <a:fontRef idx="minor">
+                  <a:schemeClr val="tx1"/>
+                </a:fontRef>
+              </p:style>
+            </p:cxnSp>
+            <p:cxnSp>
+              <p:nvCxnSpPr>
+                <p:cNvPr id="38" name="直接连接符 37">
+                  <a:extLst>
+                    <a:ext uri="{FF2B5EF4-FFF2-40B4-BE49-F238E27FC236}">
+                      <a16:creationId xmlns:a16="http://schemas.microsoft.com/office/drawing/2014/main" id="{9D86AB7C-C07D-4C4F-CED8-F02DADB2DDA4}"/>
+                    </a:ext>
+                  </a:extLst>
+                </p:cNvPr>
+                <p:cNvCxnSpPr>
+                  <a:cxnSpLocks/>
+                </p:cNvCxnSpPr>
+                <p:nvPr/>
+              </p:nvCxnSpPr>
+              <p:spPr>
+                <a:xfrm>
+                  <a:off x="7602514" y="1858559"/>
+                  <a:ext cx="0" cy="500485"/>
+                </a:xfrm>
+                <a:prstGeom prst="line">
+                  <a:avLst/>
+                </a:prstGeom>
+                <a:ln w="12700">
+                  <a:solidFill>
+                    <a:schemeClr val="tx1"/>
+                  </a:solidFill>
+                </a:ln>
+              </p:spPr>
+              <p:style>
+                <a:lnRef idx="1">
+                  <a:schemeClr val="accent1"/>
+                </a:lnRef>
+                <a:fillRef idx="0">
+                  <a:schemeClr val="accent1"/>
+                </a:fillRef>
+                <a:effectRef idx="0">
+                  <a:schemeClr val="accent1"/>
+                </a:effectRef>
+                <a:fontRef idx="minor">
+                  <a:schemeClr val="tx1"/>
+                </a:fontRef>
+              </p:style>
+            </p:cxnSp>
+            <p:cxnSp>
+              <p:nvCxnSpPr>
+                <p:cNvPr id="39" name="直接连接符 38">
+                  <a:extLst>
+                    <a:ext uri="{FF2B5EF4-FFF2-40B4-BE49-F238E27FC236}">
+                      <a16:creationId xmlns:a16="http://schemas.microsoft.com/office/drawing/2014/main" id="{FBB32734-BA2B-5D41-A701-1E5CDBBA39BE}"/>
+                    </a:ext>
+                  </a:extLst>
+                </p:cNvPr>
+                <p:cNvCxnSpPr>
+                  <a:cxnSpLocks/>
+                </p:cNvCxnSpPr>
+                <p:nvPr/>
+              </p:nvCxnSpPr>
+              <p:spPr>
+                <a:xfrm>
+                  <a:off x="8148990" y="1858559"/>
+                  <a:ext cx="0" cy="500485"/>
+                </a:xfrm>
+                <a:prstGeom prst="line">
+                  <a:avLst/>
+                </a:prstGeom>
+                <a:ln w="12700">
+                  <a:solidFill>
+                    <a:schemeClr val="tx1"/>
+                  </a:solidFill>
+                </a:ln>
+              </p:spPr>
+              <p:style>
+                <a:lnRef idx="1">
+                  <a:schemeClr val="accent1"/>
+                </a:lnRef>
+                <a:fillRef idx="0">
+                  <a:schemeClr val="accent1"/>
+                </a:fillRef>
+                <a:effectRef idx="0">
+                  <a:schemeClr val="accent1"/>
+                </a:effectRef>
+                <a:fontRef idx="minor">
+                  <a:schemeClr val="tx1"/>
+                </a:fontRef>
+              </p:style>
+            </p:cxnSp>
+            <p:cxnSp>
+              <p:nvCxnSpPr>
+                <p:cNvPr id="40" name="直接连接符 39">
+                  <a:extLst>
+                    <a:ext uri="{FF2B5EF4-FFF2-40B4-BE49-F238E27FC236}">
+                      <a16:creationId xmlns:a16="http://schemas.microsoft.com/office/drawing/2014/main" id="{7DDCD3F3-D421-E50B-B216-B7A4894C9596}"/>
+                    </a:ext>
+                  </a:extLst>
+                </p:cNvPr>
+                <p:cNvCxnSpPr>
+                  <a:cxnSpLocks/>
+                </p:cNvCxnSpPr>
+                <p:nvPr/>
+              </p:nvCxnSpPr>
+              <p:spPr>
+                <a:xfrm>
+                  <a:off x="8695466" y="1858559"/>
+                  <a:ext cx="0" cy="500485"/>
+                </a:xfrm>
+                <a:prstGeom prst="line">
+                  <a:avLst/>
+                </a:prstGeom>
+                <a:ln w="12700">
+                  <a:solidFill>
+                    <a:schemeClr val="tx1"/>
+                  </a:solidFill>
+                </a:ln>
+              </p:spPr>
+              <p:style>
+                <a:lnRef idx="1">
+                  <a:schemeClr val="accent1"/>
+                </a:lnRef>
+                <a:fillRef idx="0">
+                  <a:schemeClr val="accent1"/>
+                </a:fillRef>
+                <a:effectRef idx="0">
+                  <a:schemeClr val="accent1"/>
+                </a:effectRef>
+                <a:fontRef idx="minor">
+                  <a:schemeClr val="tx1"/>
+                </a:fontRef>
+              </p:style>
+            </p:cxnSp>
+            <p:cxnSp>
+              <p:nvCxnSpPr>
+                <p:cNvPr id="43" name="直接连接符 42">
+                  <a:extLst>
+                    <a:ext uri="{FF2B5EF4-FFF2-40B4-BE49-F238E27FC236}">
+                      <a16:creationId xmlns:a16="http://schemas.microsoft.com/office/drawing/2014/main" id="{6021C40B-D2CB-DF06-9249-C46CC0821FAB}"/>
+                    </a:ext>
+                  </a:extLst>
+                </p:cNvPr>
+                <p:cNvCxnSpPr>
+                  <a:cxnSpLocks/>
+                </p:cNvCxnSpPr>
+                <p:nvPr/>
+              </p:nvCxnSpPr>
+              <p:spPr>
+                <a:xfrm>
+                  <a:off x="2137754" y="1358074"/>
+                  <a:ext cx="0" cy="500485"/>
+                </a:xfrm>
+                <a:prstGeom prst="line">
+                  <a:avLst/>
+                </a:prstGeom>
+                <a:ln w="12700">
+                  <a:solidFill>
+                    <a:schemeClr val="tx1"/>
+                  </a:solidFill>
+                </a:ln>
+              </p:spPr>
+              <p:style>
+                <a:lnRef idx="1">
+                  <a:schemeClr val="accent1"/>
+                </a:lnRef>
+                <a:fillRef idx="0">
+                  <a:schemeClr val="accent1"/>
+                </a:fillRef>
+                <a:effectRef idx="0">
+                  <a:schemeClr val="accent1"/>
+                </a:effectRef>
+                <a:fontRef idx="minor">
+                  <a:schemeClr val="tx1"/>
+                </a:fontRef>
+              </p:style>
+            </p:cxnSp>
+            <p:cxnSp>
+              <p:nvCxnSpPr>
+                <p:cNvPr id="44" name="直接连接符 43">
+                  <a:extLst>
+                    <a:ext uri="{FF2B5EF4-FFF2-40B4-BE49-F238E27FC236}">
+                      <a16:creationId xmlns:a16="http://schemas.microsoft.com/office/drawing/2014/main" id="{02525B0C-B57B-B7C3-B86F-741518614329}"/>
+                    </a:ext>
+                  </a:extLst>
+                </p:cNvPr>
+                <p:cNvCxnSpPr>
+                  <a:cxnSpLocks/>
+                </p:cNvCxnSpPr>
+                <p:nvPr/>
+              </p:nvCxnSpPr>
+              <p:spPr>
+                <a:xfrm>
+                  <a:off x="5416610" y="1358074"/>
+                  <a:ext cx="0" cy="500485"/>
+                </a:xfrm>
+                <a:prstGeom prst="line">
+                  <a:avLst/>
+                </a:prstGeom>
+                <a:ln w="12700">
+                  <a:solidFill>
+                    <a:schemeClr val="tx1"/>
+                  </a:solidFill>
+                </a:ln>
+              </p:spPr>
+              <p:style>
+                <a:lnRef idx="1">
+                  <a:schemeClr val="accent1"/>
+                </a:lnRef>
+                <a:fillRef idx="0">
+                  <a:schemeClr val="accent1"/>
+                </a:fillRef>
+                <a:effectRef idx="0">
+                  <a:schemeClr val="accent1"/>
+                </a:effectRef>
+                <a:fontRef idx="minor">
+                  <a:schemeClr val="tx1"/>
+                </a:fontRef>
+              </p:style>
+            </p:cxnSp>
+            <p:cxnSp>
+              <p:nvCxnSpPr>
+                <p:cNvPr id="45" name="直接连接符 44">
+                  <a:extLst>
+                    <a:ext uri="{FF2B5EF4-FFF2-40B4-BE49-F238E27FC236}">
+                      <a16:creationId xmlns:a16="http://schemas.microsoft.com/office/drawing/2014/main" id="{6C66E90D-733A-9C23-3BE3-F92336BA9822}"/>
+                    </a:ext>
+                  </a:extLst>
+                </p:cNvPr>
+                <p:cNvCxnSpPr>
+                  <a:cxnSpLocks/>
+                </p:cNvCxnSpPr>
+                <p:nvPr/>
+              </p:nvCxnSpPr>
+              <p:spPr>
+                <a:xfrm>
+                  <a:off x="6509562" y="1358074"/>
+                  <a:ext cx="0" cy="500485"/>
+                </a:xfrm>
+                <a:prstGeom prst="line">
+                  <a:avLst/>
+                </a:prstGeom>
+                <a:ln w="12700">
+                  <a:solidFill>
+                    <a:schemeClr val="tx1"/>
+                  </a:solidFill>
+                </a:ln>
+              </p:spPr>
+              <p:style>
+                <a:lnRef idx="1">
+                  <a:schemeClr val="accent1"/>
+                </a:lnRef>
+                <a:fillRef idx="0">
+                  <a:schemeClr val="accent1"/>
+                </a:fillRef>
+                <a:effectRef idx="0">
+                  <a:schemeClr val="accent1"/>
+                </a:effectRef>
+                <a:fontRef idx="minor">
+                  <a:schemeClr val="tx1"/>
+                </a:fontRef>
+              </p:style>
+            </p:cxnSp>
+            <p:cxnSp>
+              <p:nvCxnSpPr>
+                <p:cNvPr id="46" name="直接连接符 45">
+                  <a:extLst>
+                    <a:ext uri="{FF2B5EF4-FFF2-40B4-BE49-F238E27FC236}">
+                      <a16:creationId xmlns:a16="http://schemas.microsoft.com/office/drawing/2014/main" id="{1018E17C-89AF-85DB-F195-B44C8EF0C138}"/>
+                    </a:ext>
+                  </a:extLst>
+                </p:cNvPr>
+                <p:cNvCxnSpPr>
+                  <a:cxnSpLocks/>
+                </p:cNvCxnSpPr>
+                <p:nvPr/>
+              </p:nvCxnSpPr>
+              <p:spPr>
+                <a:xfrm>
+                  <a:off x="8148990" y="1358073"/>
+                  <a:ext cx="0" cy="500485"/>
+                </a:xfrm>
+                <a:prstGeom prst="line">
+                  <a:avLst/>
+                </a:prstGeom>
+                <a:ln w="12700">
+                  <a:solidFill>
+                    <a:schemeClr val="tx1"/>
+                  </a:solidFill>
+                </a:ln>
+              </p:spPr>
+              <p:style>
+                <a:lnRef idx="1">
+                  <a:schemeClr val="accent1"/>
+                </a:lnRef>
+                <a:fillRef idx="0">
+                  <a:schemeClr val="accent1"/>
+                </a:fillRef>
+                <a:effectRef idx="0">
+                  <a:schemeClr val="accent1"/>
+                </a:effectRef>
+                <a:fontRef idx="minor">
+                  <a:schemeClr val="tx1"/>
+                </a:fontRef>
+              </p:style>
+            </p:cxnSp>
+          </p:grpSp>
+          <p:sp>
+            <p:nvSpPr>
+              <p:cNvPr id="48" name="文本框 47">
+                <a:extLst>
+                  <a:ext uri="{FF2B5EF4-FFF2-40B4-BE49-F238E27FC236}">
+                    <a16:creationId xmlns:a16="http://schemas.microsoft.com/office/drawing/2014/main" id="{762D6E86-7085-155D-1185-44A40754DD25}"/>
+                  </a:ext>
+                </a:extLst>
+              </p:cNvPr>
+              <p:cNvSpPr txBox="1"/>
+              <p:nvPr/>
+            </p:nvSpPr>
+            <p:spPr>
+              <a:xfrm>
+                <a:off x="1051824" y="1479957"/>
+                <a:ext cx="1204690" cy="369332"/>
+              </a:xfrm>
+              <a:prstGeom prst="rect">
+                <a:avLst/>
+              </a:prstGeom>
+              <a:noFill/>
+            </p:spPr>
+            <p:txBody>
+              <a:bodyPr wrap="square" rtlCol="0">
+                <a:spAutoFit/>
+              </a:bodyPr>
+              <a:lstStyle/>
+              <a:p>
+                <a:pPr algn="ctr"/>
+                <a:r>
+                  <a:rPr lang="en-US" dirty="0"/>
+                  <a:t>basic</a:t>
+                </a:r>
+              </a:p>
+            </p:txBody>
+          </p:sp>
+          <p:sp>
+            <p:nvSpPr>
+              <p:cNvPr id="49" name="文本框 48">
+                <a:extLst>
+                  <a:ext uri="{FF2B5EF4-FFF2-40B4-BE49-F238E27FC236}">
+                    <a16:creationId xmlns:a16="http://schemas.microsoft.com/office/drawing/2014/main" id="{E785A98E-CEA4-1002-558C-9BC97EEA7BDD}"/>
+                  </a:ext>
+                </a:extLst>
+              </p:cNvPr>
+              <p:cNvSpPr txBox="1"/>
+              <p:nvPr/>
+            </p:nvSpPr>
+            <p:spPr>
+              <a:xfrm>
+                <a:off x="5897261" y="1484181"/>
+                <a:ext cx="1204690" cy="338554"/>
+              </a:xfrm>
+              <a:prstGeom prst="rect">
+                <a:avLst/>
+              </a:prstGeom>
+              <a:noFill/>
+            </p:spPr>
+            <p:txBody>
+              <a:bodyPr wrap="square" rtlCol="0">
+                <a:spAutoFit/>
+              </a:bodyPr>
+              <a:lstStyle/>
+              <a:p>
+                <a:pPr algn="ctr"/>
+                <a:r>
+                  <a:rPr lang="en-US" sz="1600" dirty="0"/>
+                  <a:t>connection</a:t>
+                </a:r>
+                <a:endParaRPr lang="en-US" dirty="0"/>
+              </a:p>
+            </p:txBody>
+          </p:sp>
+          <p:sp>
+            <p:nvSpPr>
+              <p:cNvPr id="50" name="文本框 49">
+                <a:extLst>
+                  <a:ext uri="{FF2B5EF4-FFF2-40B4-BE49-F238E27FC236}">
+                    <a16:creationId xmlns:a16="http://schemas.microsoft.com/office/drawing/2014/main" id="{A5EFC53D-7ABB-9D5F-554C-0D6366F81D9E}"/>
+                  </a:ext>
+                </a:extLst>
+              </p:cNvPr>
+              <p:cNvSpPr txBox="1"/>
+              <p:nvPr/>
+            </p:nvSpPr>
+            <p:spPr>
+              <a:xfrm>
+                <a:off x="2276767" y="1478196"/>
+                <a:ext cx="3616491" cy="369332"/>
+              </a:xfrm>
+              <a:prstGeom prst="rect">
+                <a:avLst/>
+              </a:prstGeom>
+              <a:noFill/>
+            </p:spPr>
+            <p:txBody>
+              <a:bodyPr wrap="square" rtlCol="0">
+                <a:spAutoFit/>
+              </a:bodyPr>
+              <a:lstStyle/>
+              <a:p>
+                <a:pPr algn="ctr"/>
+                <a:r>
+                  <a:rPr lang="en-US" dirty="0"/>
+                  <a:t>property</a:t>
+                </a:r>
+              </a:p>
+            </p:txBody>
+          </p:sp>
+          <p:sp>
+            <p:nvSpPr>
+              <p:cNvPr id="51" name="文本框 50">
+                <a:extLst>
+                  <a:ext uri="{FF2B5EF4-FFF2-40B4-BE49-F238E27FC236}">
+                    <a16:creationId xmlns:a16="http://schemas.microsoft.com/office/drawing/2014/main" id="{2CF98BE3-B118-6A51-DC78-E454FF641001}"/>
+                  </a:ext>
+                </a:extLst>
+              </p:cNvPr>
+              <p:cNvSpPr txBox="1"/>
+              <p:nvPr/>
+            </p:nvSpPr>
+            <p:spPr>
+              <a:xfrm>
+                <a:off x="8943311" y="1483940"/>
+                <a:ext cx="1204690" cy="369332"/>
+              </a:xfrm>
+              <a:prstGeom prst="rect">
+                <a:avLst/>
+              </a:prstGeom>
+              <a:noFill/>
+            </p:spPr>
+            <p:txBody>
+              <a:bodyPr wrap="square" rtlCol="0">
+                <a:spAutoFit/>
+              </a:bodyPr>
+              <a:lstStyle/>
+              <a:p>
+                <a:pPr algn="ctr"/>
+                <a:r>
+                  <a:rPr lang="en-US" dirty="0"/>
+                  <a:t>status</a:t>
+                </a:r>
+              </a:p>
+            </p:txBody>
+          </p:sp>
+          <p:sp>
+            <p:nvSpPr>
+              <p:cNvPr id="52" name="文本框 51">
+                <a:extLst>
+                  <a:ext uri="{FF2B5EF4-FFF2-40B4-BE49-F238E27FC236}">
+                    <a16:creationId xmlns:a16="http://schemas.microsoft.com/office/drawing/2014/main" id="{9E16821A-D9BC-4F69-CA89-1C086A12504C}"/>
+                  </a:ext>
+                </a:extLst>
+              </p:cNvPr>
+              <p:cNvSpPr txBox="1"/>
+              <p:nvPr/>
+            </p:nvSpPr>
+            <p:spPr>
+              <a:xfrm>
+                <a:off x="7116638" y="1484353"/>
+                <a:ext cx="1787827" cy="369332"/>
+              </a:xfrm>
+              <a:prstGeom prst="rect">
+                <a:avLst/>
+              </a:prstGeom>
+              <a:noFill/>
+            </p:spPr>
+            <p:txBody>
+              <a:bodyPr wrap="square" rtlCol="0">
+                <a:spAutoFit/>
+              </a:bodyPr>
+              <a:lstStyle/>
+              <a:p>
+                <a:pPr algn="ctr"/>
+                <a:r>
+                  <a:rPr lang="en-US" dirty="0"/>
+                  <a:t>error</a:t>
+                </a:r>
+              </a:p>
+            </p:txBody>
+          </p:sp>
+        </p:grpSp>
+        <p:sp>
+          <p:nvSpPr>
+            <p:cNvPr id="55" name="文本框 54">
+              <a:extLst>
+                <a:ext uri="{FF2B5EF4-FFF2-40B4-BE49-F238E27FC236}">
+                  <a16:creationId xmlns:a16="http://schemas.microsoft.com/office/drawing/2014/main" id="{34D15775-7CB8-0638-86B5-191B77776FEF}"/>
+                </a:ext>
+              </a:extLst>
+            </p:cNvPr>
+            <p:cNvSpPr txBox="1"/>
+            <p:nvPr/>
+          </p:nvSpPr>
+          <p:spPr>
+            <a:xfrm>
+              <a:off x="1066392" y="1985861"/>
+              <a:ext cx="581306" cy="307777"/>
+            </a:xfrm>
+            <a:prstGeom prst="rect">
+              <a:avLst/>
+            </a:prstGeom>
+            <a:noFill/>
+          </p:spPr>
+          <p:txBody>
+            <a:bodyPr wrap="square" rtlCol="0">
+              <a:spAutoFit/>
+            </a:bodyPr>
+            <a:lstStyle/>
+            <a:p>
+              <a:r>
+                <a:rPr lang="en-US" sz="1400" dirty="0"/>
+                <a:t>Row</a:t>
+              </a:r>
+              <a:r>
+                <a:rPr lang="en-US" sz="1000" b="1" dirty="0"/>
+                <a:t>.</a:t>
+              </a:r>
+              <a:endParaRPr lang="en-US" b="1" dirty="0"/>
+            </a:p>
+          </p:txBody>
+        </p:sp>
+        <p:sp>
+          <p:nvSpPr>
+            <p:cNvPr id="56" name="文本框 55">
+              <a:extLst>
+                <a:ext uri="{FF2B5EF4-FFF2-40B4-BE49-F238E27FC236}">
+                  <a16:creationId xmlns:a16="http://schemas.microsoft.com/office/drawing/2014/main" id="{E82D77E0-34BD-C184-CE7C-FBF4787E7BE5}"/>
+                </a:ext>
+              </a:extLst>
+            </p:cNvPr>
+            <p:cNvSpPr txBox="1"/>
+            <p:nvPr/>
+          </p:nvSpPr>
+          <p:spPr>
+            <a:xfrm>
+              <a:off x="1675213" y="1985861"/>
+              <a:ext cx="581306" cy="307777"/>
+            </a:xfrm>
+            <a:prstGeom prst="rect">
+              <a:avLst/>
+            </a:prstGeom>
+            <a:noFill/>
+          </p:spPr>
+          <p:txBody>
+            <a:bodyPr wrap="square" rtlCol="0">
+              <a:spAutoFit/>
+            </a:bodyPr>
+            <a:lstStyle/>
+            <a:p>
+              <a:r>
+                <a:rPr lang="en-US" sz="1400" dirty="0"/>
+                <a:t>time</a:t>
+              </a:r>
+            </a:p>
+          </p:txBody>
+        </p:sp>
+        <p:sp>
+          <p:nvSpPr>
+            <p:cNvPr id="57" name="文本框 56">
+              <a:extLst>
+                <a:ext uri="{FF2B5EF4-FFF2-40B4-BE49-F238E27FC236}">
+                  <a16:creationId xmlns:a16="http://schemas.microsoft.com/office/drawing/2014/main" id="{88CC65B2-83A2-05D1-07A5-842A0991E3D2}"/>
+                </a:ext>
+              </a:extLst>
+            </p:cNvPr>
+            <p:cNvSpPr txBox="1"/>
+            <p:nvPr/>
+          </p:nvSpPr>
+          <p:spPr>
+            <a:xfrm>
+              <a:off x="2293739" y="1985861"/>
+              <a:ext cx="581306" cy="307777"/>
+            </a:xfrm>
+            <a:prstGeom prst="rect">
+              <a:avLst/>
+            </a:prstGeom>
+            <a:noFill/>
+          </p:spPr>
+          <p:txBody>
+            <a:bodyPr wrap="square" rtlCol="0">
+              <a:spAutoFit/>
+            </a:bodyPr>
+            <a:lstStyle/>
+            <a:p>
+              <a:r>
+                <a:rPr lang="en-US" sz="1400" dirty="0"/>
+                <a:t>MAC</a:t>
+              </a:r>
+            </a:p>
+          </p:txBody>
+        </p:sp>
+        <p:sp>
+          <p:nvSpPr>
+            <p:cNvPr id="58" name="文本框 57">
+              <a:extLst>
+                <a:ext uri="{FF2B5EF4-FFF2-40B4-BE49-F238E27FC236}">
+                  <a16:creationId xmlns:a16="http://schemas.microsoft.com/office/drawing/2014/main" id="{2EDCD2F4-62B2-EC78-B875-B232B9A30D1E}"/>
+                </a:ext>
+              </a:extLst>
+            </p:cNvPr>
+            <p:cNvSpPr txBox="1"/>
+            <p:nvPr/>
+          </p:nvSpPr>
+          <p:spPr>
+            <a:xfrm>
+              <a:off x="2880440" y="1985861"/>
+              <a:ext cx="581306" cy="307777"/>
+            </a:xfrm>
+            <a:prstGeom prst="rect">
+              <a:avLst/>
+            </a:prstGeom>
+            <a:noFill/>
+          </p:spPr>
+          <p:txBody>
+            <a:bodyPr wrap="square" rtlCol="0">
+              <a:spAutoFit/>
+            </a:bodyPr>
+            <a:lstStyle/>
+            <a:p>
+              <a:pPr algn="just"/>
+              <a:r>
+                <a:rPr lang="en-US" sz="1400" dirty="0"/>
+                <a:t>PCM</a:t>
+              </a:r>
+            </a:p>
+          </p:txBody>
+        </p:sp>
+        <p:sp>
+          <p:nvSpPr>
+            <p:cNvPr id="59" name="文本框 58">
+              <a:extLst>
+                <a:ext uri="{FF2B5EF4-FFF2-40B4-BE49-F238E27FC236}">
+                  <a16:creationId xmlns:a16="http://schemas.microsoft.com/office/drawing/2014/main" id="{D3D5DFC6-EAC9-4649-1FCA-0C0C8C1C08CA}"/>
+                </a:ext>
+              </a:extLst>
+            </p:cNvPr>
+            <p:cNvSpPr txBox="1"/>
+            <p:nvPr/>
+          </p:nvSpPr>
+          <p:spPr>
+            <a:xfrm>
+              <a:off x="4148234" y="1985861"/>
+              <a:ext cx="581306" cy="307777"/>
+            </a:xfrm>
+            <a:prstGeom prst="rect">
+              <a:avLst/>
+            </a:prstGeom>
+            <a:noFill/>
+          </p:spPr>
+          <p:txBody>
+            <a:bodyPr wrap="square" rtlCol="0">
+              <a:spAutoFit/>
+            </a:bodyPr>
+            <a:lstStyle/>
+            <a:p>
+              <a:r>
+                <a:rPr lang="en-US" sz="1400" dirty="0"/>
+                <a:t>air.</a:t>
+              </a:r>
+            </a:p>
+          </p:txBody>
+        </p:sp>
+        <p:sp>
+          <p:nvSpPr>
+            <p:cNvPr id="60" name="文本框 59">
+              <a:extLst>
+                <a:ext uri="{FF2B5EF4-FFF2-40B4-BE49-F238E27FC236}">
+                  <a16:creationId xmlns:a16="http://schemas.microsoft.com/office/drawing/2014/main" id="{26AC7B1D-23B5-B27E-A109-A647DC80E236}"/>
+                </a:ext>
+              </a:extLst>
+            </p:cNvPr>
+            <p:cNvSpPr txBox="1"/>
+            <p:nvPr/>
+          </p:nvSpPr>
+          <p:spPr>
+            <a:xfrm>
+              <a:off x="3497268" y="1985861"/>
+              <a:ext cx="559740" cy="307777"/>
+            </a:xfrm>
+            <a:prstGeom prst="rect">
+              <a:avLst/>
+            </a:prstGeom>
+            <a:noFill/>
+          </p:spPr>
+          <p:txBody>
+            <a:bodyPr wrap="square" rtlCol="0">
+              <a:spAutoFit/>
+            </a:bodyPr>
+            <a:lstStyle/>
+            <a:p>
+              <a:r>
+                <a:rPr lang="en-US" sz="1400" dirty="0"/>
+                <a:t>dep</a:t>
+              </a:r>
+              <a:r>
+                <a:rPr lang="en-US" sz="1200" b="1" dirty="0"/>
+                <a:t>.</a:t>
+              </a:r>
+              <a:endParaRPr lang="en-US" sz="1000" b="1" dirty="0"/>
+            </a:p>
+          </p:txBody>
+        </p:sp>
+        <p:sp>
+          <p:nvSpPr>
+            <p:cNvPr id="61" name="文本框 60">
+              <a:extLst>
+                <a:ext uri="{FF2B5EF4-FFF2-40B4-BE49-F238E27FC236}">
+                  <a16:creationId xmlns:a16="http://schemas.microsoft.com/office/drawing/2014/main" id="{4B25E08B-9A2E-3ED2-175A-197BE514158C}"/>
+                </a:ext>
+              </a:extLst>
+            </p:cNvPr>
+            <p:cNvSpPr txBox="1"/>
+            <p:nvPr/>
+          </p:nvSpPr>
+          <p:spPr>
+            <a:xfrm>
+              <a:off x="4748923" y="1985861"/>
+              <a:ext cx="581306" cy="307777"/>
+            </a:xfrm>
+            <a:prstGeom prst="rect">
+              <a:avLst/>
+            </a:prstGeom>
+            <a:noFill/>
+          </p:spPr>
+          <p:txBody>
+            <a:bodyPr wrap="square" rtlCol="0">
+              <a:spAutoFit/>
+            </a:bodyPr>
+            <a:lstStyle/>
+            <a:p>
+              <a:r>
+                <a:rPr lang="en-US" sz="1400" dirty="0"/>
+                <a:t>con.</a:t>
+              </a:r>
+            </a:p>
+          </p:txBody>
+        </p:sp>
+        <p:sp>
+          <p:nvSpPr>
+            <p:cNvPr id="62" name="文本框 61">
+              <a:extLst>
+                <a:ext uri="{FF2B5EF4-FFF2-40B4-BE49-F238E27FC236}">
+                  <a16:creationId xmlns:a16="http://schemas.microsoft.com/office/drawing/2014/main" id="{AFC16A76-A13D-A158-E434-5005A7E1C470}"/>
+                </a:ext>
+              </a:extLst>
+            </p:cNvPr>
+            <p:cNvSpPr txBox="1"/>
+            <p:nvPr/>
+          </p:nvSpPr>
+          <p:spPr>
+            <a:xfrm>
+              <a:off x="5342637" y="1985861"/>
+              <a:ext cx="581306" cy="307777"/>
+            </a:xfrm>
+            <a:prstGeom prst="rect">
+              <a:avLst/>
+            </a:prstGeom>
+            <a:noFill/>
+          </p:spPr>
+          <p:txBody>
+            <a:bodyPr wrap="square" rtlCol="0">
+              <a:spAutoFit/>
+            </a:bodyPr>
+            <a:lstStyle/>
+            <a:p>
+              <a:r>
+                <a:rPr lang="en-US" sz="1400" dirty="0"/>
+                <a:t>age.</a:t>
+              </a:r>
+            </a:p>
+          </p:txBody>
+        </p:sp>
+        <p:sp>
+          <p:nvSpPr>
+            <p:cNvPr id="63" name="文本框 62">
+              <a:extLst>
+                <a:ext uri="{FF2B5EF4-FFF2-40B4-BE49-F238E27FC236}">
+                  <a16:creationId xmlns:a16="http://schemas.microsoft.com/office/drawing/2014/main" id="{56EC36AC-522B-0801-E07E-4755321FE125}"/>
+                </a:ext>
+              </a:extLst>
+            </p:cNvPr>
+            <p:cNvSpPr txBox="1"/>
+            <p:nvPr/>
+          </p:nvSpPr>
+          <p:spPr>
+            <a:xfrm>
+              <a:off x="5958473" y="1955084"/>
+              <a:ext cx="581306" cy="338554"/>
+            </a:xfrm>
+            <a:prstGeom prst="rect">
+              <a:avLst/>
+            </a:prstGeom>
+            <a:noFill/>
+          </p:spPr>
+          <p:txBody>
+            <a:bodyPr wrap="square" rtlCol="0">
+              <a:spAutoFit/>
+            </a:bodyPr>
+            <a:lstStyle/>
+            <a:p>
+              <a:r>
+                <a:rPr lang="en-US" sz="1400" dirty="0"/>
+                <a:t>req</a:t>
+              </a:r>
+              <a:r>
+                <a:rPr lang="en-US" sz="1600" dirty="0"/>
+                <a:t>.</a:t>
+              </a:r>
+              <a:endParaRPr lang="en-US" dirty="0"/>
+            </a:p>
+          </p:txBody>
+        </p:sp>
+        <p:sp>
+          <p:nvSpPr>
+            <p:cNvPr id="64" name="文本框 63">
+              <a:extLst>
+                <a:ext uri="{FF2B5EF4-FFF2-40B4-BE49-F238E27FC236}">
+                  <a16:creationId xmlns:a16="http://schemas.microsoft.com/office/drawing/2014/main" id="{7AE94888-3BDB-91D0-5FF1-BCDB2498061E}"/>
+                </a:ext>
+              </a:extLst>
+            </p:cNvPr>
+            <p:cNvSpPr txBox="1"/>
+            <p:nvPr/>
+          </p:nvSpPr>
+          <p:spPr>
+            <a:xfrm>
+              <a:off x="6513086" y="1985861"/>
+              <a:ext cx="581306" cy="307777"/>
+            </a:xfrm>
+            <a:prstGeom prst="rect">
+              <a:avLst/>
+            </a:prstGeom>
+            <a:noFill/>
+          </p:spPr>
+          <p:txBody>
+            <a:bodyPr wrap="square" rtlCol="0">
+              <a:spAutoFit/>
+            </a:bodyPr>
+            <a:lstStyle/>
+            <a:p>
+              <a:r>
+                <a:rPr lang="en-US" sz="1400" dirty="0"/>
+                <a:t>res.</a:t>
+              </a:r>
+            </a:p>
+          </p:txBody>
+        </p:sp>
+        <p:sp>
+          <p:nvSpPr>
+            <p:cNvPr id="65" name="文本框 64">
+              <a:extLst>
+                <a:ext uri="{FF2B5EF4-FFF2-40B4-BE49-F238E27FC236}">
+                  <a16:creationId xmlns:a16="http://schemas.microsoft.com/office/drawing/2014/main" id="{6D7311CB-10ED-32DF-8191-FF7940F8D8B9}"/>
+                </a:ext>
+              </a:extLst>
+            </p:cNvPr>
+            <p:cNvSpPr txBox="1"/>
+            <p:nvPr/>
+          </p:nvSpPr>
+          <p:spPr>
+            <a:xfrm>
+              <a:off x="7141166" y="1985861"/>
+              <a:ext cx="581306" cy="307777"/>
+            </a:xfrm>
+            <a:prstGeom prst="rect">
+              <a:avLst/>
+            </a:prstGeom>
+            <a:noFill/>
+          </p:spPr>
+          <p:txBody>
+            <a:bodyPr wrap="square" rtlCol="0">
+              <a:spAutoFit/>
+            </a:bodyPr>
+            <a:lstStyle/>
+            <a:p>
+              <a:r>
+                <a:rPr lang="en-US" sz="1400" dirty="0"/>
+                <a:t>err.</a:t>
+              </a:r>
+            </a:p>
+          </p:txBody>
+        </p:sp>
+        <p:sp>
+          <p:nvSpPr>
+            <p:cNvPr id="66" name="文本框 65">
+              <a:extLst>
+                <a:ext uri="{FF2B5EF4-FFF2-40B4-BE49-F238E27FC236}">
+                  <a16:creationId xmlns:a16="http://schemas.microsoft.com/office/drawing/2014/main" id="{0C1C9210-B0A9-9E77-CE63-4F8A67DD8685}"/>
+                </a:ext>
+              </a:extLst>
+            </p:cNvPr>
+            <p:cNvSpPr txBox="1"/>
+            <p:nvPr/>
+          </p:nvSpPr>
+          <p:spPr>
+            <a:xfrm>
+              <a:off x="7752027" y="1985861"/>
+              <a:ext cx="606124" cy="307777"/>
+            </a:xfrm>
+            <a:prstGeom prst="rect">
+              <a:avLst/>
+            </a:prstGeom>
+            <a:noFill/>
+          </p:spPr>
+          <p:txBody>
+            <a:bodyPr wrap="square" rtlCol="0">
+              <a:spAutoFit/>
+            </a:bodyPr>
+            <a:lstStyle/>
+            <a:p>
+              <a:r>
+                <a:rPr lang="en-US" sz="1400" dirty="0"/>
+                <a:t>code</a:t>
+              </a:r>
+            </a:p>
+          </p:txBody>
+        </p:sp>
+        <p:sp>
+          <p:nvSpPr>
+            <p:cNvPr id="67" name="文本框 66">
+              <a:extLst>
+                <a:ext uri="{FF2B5EF4-FFF2-40B4-BE49-F238E27FC236}">
+                  <a16:creationId xmlns:a16="http://schemas.microsoft.com/office/drawing/2014/main" id="{0E1F77B9-6098-B120-13F8-20BA3E479588}"/>
+                </a:ext>
+              </a:extLst>
+            </p:cNvPr>
+            <p:cNvSpPr txBox="1"/>
+            <p:nvPr/>
+          </p:nvSpPr>
+          <p:spPr>
+            <a:xfrm>
+              <a:off x="8347318" y="1985861"/>
+              <a:ext cx="606124" cy="307777"/>
+            </a:xfrm>
+            <a:prstGeom prst="rect">
+              <a:avLst/>
+            </a:prstGeom>
+            <a:noFill/>
+          </p:spPr>
+          <p:txBody>
+            <a:bodyPr wrap="square" rtlCol="0">
+              <a:spAutoFit/>
+            </a:bodyPr>
+            <a:lstStyle/>
+            <a:p>
+              <a:r>
+                <a:rPr lang="en-US" sz="1400" dirty="0"/>
+                <a:t>type</a:t>
+              </a:r>
+            </a:p>
+          </p:txBody>
+        </p:sp>
+        <p:sp>
+          <p:nvSpPr>
+            <p:cNvPr id="68" name="文本框 67">
+              <a:extLst>
+                <a:ext uri="{FF2B5EF4-FFF2-40B4-BE49-F238E27FC236}">
+                  <a16:creationId xmlns:a16="http://schemas.microsoft.com/office/drawing/2014/main" id="{8FE676D5-9D45-B4E1-B1FA-C24DC0A75C2F}"/>
+                </a:ext>
+              </a:extLst>
+            </p:cNvPr>
+            <p:cNvSpPr txBox="1"/>
+            <p:nvPr/>
+          </p:nvSpPr>
+          <p:spPr>
+            <a:xfrm>
+              <a:off x="8931132" y="1985861"/>
+              <a:ext cx="606124" cy="307777"/>
+            </a:xfrm>
+            <a:prstGeom prst="rect">
+              <a:avLst/>
+            </a:prstGeom>
+            <a:noFill/>
+          </p:spPr>
+          <p:txBody>
+            <a:bodyPr wrap="square" rtlCol="0">
+              <a:spAutoFit/>
+            </a:bodyPr>
+            <a:lstStyle/>
+            <a:p>
+              <a:r>
+                <a:rPr lang="en-US" sz="1400" dirty="0" err="1"/>
+                <a:t>succ</a:t>
+              </a:r>
+              <a:r>
+                <a:rPr lang="en-US" sz="1400" dirty="0"/>
+                <a:t>.</a:t>
+              </a:r>
+            </a:p>
+          </p:txBody>
+        </p:sp>
+        <p:sp>
+          <p:nvSpPr>
+            <p:cNvPr id="69" name="文本框 68">
+              <a:extLst>
+                <a:ext uri="{FF2B5EF4-FFF2-40B4-BE49-F238E27FC236}">
+                  <a16:creationId xmlns:a16="http://schemas.microsoft.com/office/drawing/2014/main" id="{11FD7125-AAAE-0215-E29D-1CF5B7FE1CF9}"/>
+                </a:ext>
+              </a:extLst>
+            </p:cNvPr>
+            <p:cNvSpPr txBox="1"/>
+            <p:nvPr/>
+          </p:nvSpPr>
+          <p:spPr>
+            <a:xfrm>
+              <a:off x="9612137" y="1985861"/>
+              <a:ext cx="606124" cy="307777"/>
+            </a:xfrm>
+            <a:prstGeom prst="rect">
+              <a:avLst/>
+            </a:prstGeom>
+            <a:noFill/>
+          </p:spPr>
+          <p:txBody>
+            <a:bodyPr wrap="square" rtlCol="0">
+              <a:spAutoFit/>
+            </a:bodyPr>
+            <a:lstStyle/>
+            <a:p>
+              <a:r>
+                <a:rPr lang="en-US" sz="1400" dirty="0"/>
+                <a:t>fail</a:t>
+              </a:r>
+            </a:p>
+          </p:txBody>
+        </p:sp>
+      </p:grpSp>
+    </p:spTree>
+    <p:extLst>
+      <p:ext uri="{BB962C8B-B14F-4D97-AF65-F5344CB8AC3E}">
+        <p14:creationId xmlns:p14="http://schemas.microsoft.com/office/powerpoint/2010/main" val="3847781923"/>
+      </p:ext>
+    </p:extLst>
+  </p:cSld>
+  <p:clrMapOvr>
+    <a:masterClrMapping/>
+  </p:clrMapOvr>
+</p:sld>
+</file>
+
 <file path=ppt/theme/theme1.xml><?xml version="1.0" encoding="utf-8"?>
 <a:theme xmlns:a="http://schemas.openxmlformats.org/drawingml/2006/main" name="Office 主题​​">
   <a:themeElements>

</xml_diff>